<commit_message>
#1 ccf finished, tested. Also the filter data issue was found and corrected. The problem was that the dimension for the initial state should be inserted where the signal dimension is. This is not clear from the documentation.
</commit_message>
<xml_diff>
--- a/docs/FLAP_UIM3_20190603.pptx
+++ b/docs/FLAP_UIM3_20190603.pptx
@@ -3275,7 +3275,7 @@
                   <a:schemeClr val="tx1"/>
                 </a:solidFill>
               </a:rPr>
-              <a:t>FLAP   UIM/2  28.03.2019                                                                                                   </a:t>
+              <a:t>FLAP   UIM/3  28.03.2019                                                                                                   </a:t>
             </a:r>
             <a:r>
               <a:rPr lang="hu-HU" sz="900" smtClean="0">
@@ -5856,19 +5856,7 @@
             </a:pPr>
             <a:r>
               <a:rPr lang="en-US" i="1" smtClean="0"/>
-              <a:t>G</a:t>
-            </a:r>
-            <a:r>
-              <a:rPr lang="en-US" i="1" smtClean="0"/>
-              <a:t>. Cseh, </a:t>
-            </a:r>
-            <a:r>
-              <a:rPr lang="en-US" i="1" smtClean="0"/>
-              <a:t>M</a:t>
-            </a:r>
-            <a:r>
-              <a:rPr lang="en-US" i="1" smtClean="0"/>
-              <a:t>. V</a:t>
+              <a:t>G. Cseh, M. V</a:t>
             </a:r>
             <a:r>
               <a:rPr lang="hu-HU" i="1" smtClean="0"/>
@@ -7091,11 +7079,7 @@
             </a:r>
             <a:r>
               <a:rPr lang="en-US"/>
-              <a:t>subplot concept can be used to create multiple plots </a:t>
-            </a:r>
-            <a:r>
-              <a:rPr lang="en-US"/>
-              <a:t>in </a:t>
+              <a:t>subplot concept can be used to create multiple plots in </a:t>
             </a:r>
             <a:r>
               <a:rPr lang="en-US" smtClean="0"/>
@@ -8529,7 +8513,7 @@
         <p:spPr>
           <a:xfrm>
             <a:off x="149469" y="891482"/>
-            <a:ext cx="9044049" cy="5078313"/>
+            <a:ext cx="9044049" cy="3416320"/>
           </a:xfrm>
           <a:prstGeom prst="rect">
             <a:avLst/>
@@ -8568,19 +8552,7 @@
               <a:rPr lang="en-US" smtClean="0">
                 <a:latin typeface="+mj-lt"/>
               </a:rPr>
-              <a:t>User’s </a:t>
-            </a:r>
-            <a:r>
-              <a:rPr lang="en-US" smtClean="0">
-                <a:latin typeface="+mj-lt"/>
-              </a:rPr>
-              <a:t>guide </a:t>
-            </a:r>
-            <a:r>
-              <a:rPr lang="en-US" smtClean="0">
-                <a:latin typeface="+mj-lt"/>
-              </a:rPr>
-              <a:t>V1.6</a:t>
+              <a:t>User’s guide V1.6</a:t>
             </a:r>
           </a:p>
           <a:p>
@@ -8597,9 +8569,6 @@
               </a:rPr>
               <a:t>Save/load</a:t>
             </a:r>
-            <a:endParaRPr lang="en-US" smtClean="0">
-              <a:latin typeface="+mj-lt"/>
-            </a:endParaRPr>
           </a:p>
           <a:p>
             <a:pPr marL="285750" indent="-285750">
@@ -8673,55 +8642,15 @@
               <a:rPr lang="en-US" smtClean="0">
                 <a:latin typeface="+mj-lt"/>
               </a:rPr>
-              <a:t>Plotting rewritten, concept defined, new plot types</a:t>
+              <a:t>Plotting rewritten, concept defined, new plot </a:t>
+            </a:r>
+            <a:r>
+              <a:rPr lang="en-US" smtClean="0">
+                <a:latin typeface="+mj-lt"/>
+              </a:rPr>
+              <a:t>types</a:t>
             </a:r>
             <a:endParaRPr lang="en-US" smtClean="0">
-              <a:latin typeface="+mj-lt"/>
-            </a:endParaRPr>
-          </a:p>
-          <a:p>
-            <a:pPr>
-              <a:lnSpc>
-                <a:spcPct val="150000"/>
-              </a:lnSpc>
-            </a:pPr>
-            <a:endParaRPr lang="en-US" smtClean="0">
-              <a:latin typeface="+mj-lt"/>
-            </a:endParaRPr>
-          </a:p>
-          <a:p>
-            <a:pPr>
-              <a:lnSpc>
-                <a:spcPct val="150000"/>
-              </a:lnSpc>
-            </a:pPr>
-            <a:endParaRPr lang="en-US" smtClean="0">
-              <a:latin typeface="+mj-lt"/>
-            </a:endParaRPr>
-          </a:p>
-          <a:p>
-            <a:pPr>
-              <a:lnSpc>
-                <a:spcPct val="150000"/>
-              </a:lnSpc>
-            </a:pPr>
-            <a:endParaRPr lang="en-US" smtClean="0">
-              <a:latin typeface="+mj-lt"/>
-            </a:endParaRPr>
-          </a:p>
-          <a:p>
-            <a:pPr>
-              <a:lnSpc>
-                <a:spcPct val="150000"/>
-              </a:lnSpc>
-            </a:pPr>
-            <a:r>
-              <a:rPr lang="en-US" smtClean="0">
-                <a:latin typeface="+mj-lt"/>
-              </a:rPr>
-              <a:t>C</a:t>
-            </a:r>
-            <a:endParaRPr lang="hu-HU" smtClean="0">
               <a:latin typeface="+mj-lt"/>
             </a:endParaRPr>
           </a:p>
@@ -8778,17 +8707,7 @@
                 <a:ea typeface="Arial Unicode MS" pitchFamily="34" charset="-128"/>
                 <a:cs typeface="Arial Unicode MS" pitchFamily="34" charset="-128"/>
               </a:rPr>
-              <a:t>Changes since </a:t>
-            </a:r>
-            <a:r>
-              <a:rPr lang="en-US" sz="2000" smtClean="0">
-                <a:solidFill>
-                  <a:schemeClr val="tx1"/>
-                </a:solidFill>
-                <a:ea typeface="Arial Unicode MS" pitchFamily="34" charset="-128"/>
-                <a:cs typeface="Arial Unicode MS" pitchFamily="34" charset="-128"/>
-              </a:rPr>
-              <a:t>UIM/2</a:t>
+              <a:t>Changes since UIM/2</a:t>
             </a:r>
             <a:endParaRPr lang="en-US" sz="2000" dirty="0">
               <a:solidFill>
@@ -8976,7 +8895,7 @@
         </p:blipFill>
         <p:spPr>
           <a:xfrm>
-            <a:off x="4144689" y="497967"/>
+            <a:off x="4144689" y="493418"/>
             <a:ext cx="5048829" cy="4198873"/>
           </a:xfrm>
           <a:prstGeom prst="rect">
@@ -8993,7 +8912,7 @@
         <p:spPr>
           <a:xfrm>
             <a:off x="149470" y="891482"/>
-            <a:ext cx="3995220" cy="6186309"/>
+            <a:ext cx="3995220" cy="5355312"/>
           </a:xfrm>
           <a:prstGeom prst="rect">
             <a:avLst/>
@@ -9024,23 +8943,55 @@
               </a:rPr>
               <a:t>      github.com/fusion-flap</a:t>
             </a:r>
+          </a:p>
+          <a:p>
+            <a:r>
+              <a:rPr lang="en-US" smtClean="0">
+                <a:latin typeface="+mj-lt"/>
+              </a:rPr>
+              <a:t>     (owner: S. Zoletnik)</a:t>
+            </a:r>
+          </a:p>
+          <a:p>
+            <a:pPr marL="285750" indent="-285750">
+              <a:buFont typeface="Arial" panose="020B0604020202020204" pitchFamily="34" charset="0"/>
+              <a:buChar char="•"/>
+            </a:pPr>
             <a:endParaRPr lang="en-US" smtClean="0">
               <a:latin typeface="+mj-lt"/>
             </a:endParaRPr>
           </a:p>
           <a:p>
-            <a:r>
-              <a:rPr lang="en-US" smtClean="0">
-                <a:latin typeface="+mj-lt"/>
-              </a:rPr>
-              <a:t>     (owner: S. Zoletnik)</a:t>
-            </a:r>
-          </a:p>
-          <a:p>
             <a:pPr marL="285750" indent="-285750">
               <a:buFont typeface="Arial" panose="020B0604020202020204" pitchFamily="34" charset="0"/>
               <a:buChar char="•"/>
             </a:pPr>
+            <a:r>
+              <a:rPr lang="en-US" smtClean="0">
+                <a:latin typeface="+mj-lt"/>
+              </a:rPr>
+              <a:t>Multiple repositories:</a:t>
+            </a:r>
+          </a:p>
+          <a:p>
+            <a:r>
+              <a:rPr lang="en-US">
+                <a:latin typeface="+mj-lt"/>
+              </a:rPr>
+              <a:t> </a:t>
+            </a:r>
+            <a:r>
+              <a:rPr lang="en-US" smtClean="0">
+                <a:latin typeface="+mj-lt"/>
+              </a:rPr>
+              <a:t>   flap + modules</a:t>
+            </a:r>
+          </a:p>
+          <a:p>
+            <a:pPr marL="285750" indent="-285750">
+              <a:buFont typeface="Arial" panose="020B0604020202020204" pitchFamily="34" charset="0"/>
+              <a:buChar char="•"/>
+            </a:pPr>
             <a:endParaRPr lang="en-US" smtClean="0">
               <a:latin typeface="+mj-lt"/>
             </a:endParaRPr>
@@ -9054,21 +9005,7 @@
               <a:rPr lang="en-US" smtClean="0">
                 <a:latin typeface="+mj-lt"/>
               </a:rPr>
-              <a:t>Multiple repositories:</a:t>
-            </a:r>
-          </a:p>
-          <a:p>
-            <a:r>
-              <a:rPr lang="en-US">
-                <a:latin typeface="+mj-lt"/>
-              </a:rPr>
-              <a:t> </a:t>
-            </a:r>
-            <a:r>
-              <a:rPr lang="en-US" smtClean="0">
-                <a:latin typeface="+mj-lt"/>
-              </a:rPr>
-              <a:t>   flap + modules</a:t>
+              <a:t>MIT license (free for everything)</a:t>
             </a:r>
           </a:p>
           <a:p>
@@ -9089,7 +9026,7 @@
               <a:rPr lang="en-US" smtClean="0">
                 <a:latin typeface="+mj-lt"/>
               </a:rPr>
-              <a:t>MIT license (free for everything)</a:t>
+              <a:t>master branch is considered as newest stable version</a:t>
             </a:r>
           </a:p>
           <a:p>
@@ -9097,6 +9034,23 @@
               <a:buFont typeface="Arial" panose="020B0604020202020204" pitchFamily="34" charset="0"/>
               <a:buChar char="•"/>
             </a:pPr>
+            <a:endParaRPr lang="en-US">
+              <a:latin typeface="+mj-lt"/>
+            </a:endParaRPr>
+          </a:p>
+          <a:p>
+            <a:pPr marL="285750" indent="-285750">
+              <a:buFont typeface="Arial" panose="020B0604020202020204" pitchFamily="34" charset="0"/>
+              <a:buChar char="•"/>
+            </a:pPr>
+            <a:r>
+              <a:rPr lang="en-US" smtClean="0">
+                <a:latin typeface="+mj-lt"/>
+              </a:rPr>
+              <a:t>Various tags (versions)</a:t>
+            </a:r>
+          </a:p>
+          <a:p>
             <a:endParaRPr lang="en-US" smtClean="0">
               <a:latin typeface="+mj-lt"/>
             </a:endParaRPr>
@@ -9110,7 +9064,7 @@
               <a:rPr lang="en-US" smtClean="0">
                 <a:latin typeface="+mj-lt"/>
               </a:rPr>
-              <a:t>master branch is considered as newest stable version</a:t>
+              <a:t>Please report issues on GitHub</a:t>
             </a:r>
           </a:p>
           <a:p>
@@ -9127,80 +9081,17 @@
               <a:buFont typeface="Arial" panose="020B0604020202020204" pitchFamily="34" charset="0"/>
               <a:buChar char="•"/>
             </a:pPr>
-            <a:r>
-              <a:rPr lang="en-US" smtClean="0">
-                <a:latin typeface="+mj-lt"/>
-              </a:rPr>
-              <a:t>Various tags (versions)</a:t>
-            </a:r>
-          </a:p>
-          <a:p>
             <a:endParaRPr lang="en-US" smtClean="0">
               <a:latin typeface="+mj-lt"/>
             </a:endParaRPr>
           </a:p>
           <a:p>
-            <a:pPr marL="285750" indent="-285750">
-              <a:buFont typeface="Arial" panose="020B0604020202020204" pitchFamily="34" charset="0"/>
-              <a:buChar char="•"/>
-            </a:pPr>
-            <a:r>
-              <a:rPr lang="en-US" smtClean="0">
-                <a:latin typeface="+mj-lt"/>
-              </a:rPr>
-              <a:t>Please report issues on GitHub</a:t>
-            </a:r>
-          </a:p>
-          <a:p>
-            <a:pPr marL="285750" indent="-285750">
-              <a:buFont typeface="Arial" panose="020B0604020202020204" pitchFamily="34" charset="0"/>
-              <a:buChar char="•"/>
-            </a:pPr>
-            <a:endParaRPr lang="en-US">
-              <a:latin typeface="+mj-lt"/>
-            </a:endParaRPr>
-          </a:p>
-          <a:p>
-            <a:pPr marL="285750" indent="-285750">
-              <a:buFont typeface="Arial" panose="020B0604020202020204" pitchFamily="34" charset="0"/>
-              <a:buChar char="•"/>
-            </a:pPr>
             <a:endParaRPr lang="en-US" smtClean="0">
               <a:latin typeface="+mj-lt"/>
             </a:endParaRPr>
           </a:p>
           <a:p>
             <a:endParaRPr lang="en-US" smtClean="0">
-              <a:latin typeface="+mj-lt"/>
-            </a:endParaRPr>
-          </a:p>
-          <a:p>
-            <a:pPr marL="285750" indent="-285750">
-              <a:buFont typeface="Arial" panose="020B0604020202020204" pitchFamily="34" charset="0"/>
-              <a:buChar char="•"/>
-            </a:pPr>
-            <a:endParaRPr lang="en-US" smtClean="0">
-              <a:latin typeface="+mj-lt"/>
-            </a:endParaRPr>
-          </a:p>
-          <a:p>
-            <a:endParaRPr lang="en-US" smtClean="0">
-              <a:latin typeface="+mj-lt"/>
-            </a:endParaRPr>
-          </a:p>
-          <a:p>
-            <a:endParaRPr lang="en-US" smtClean="0">
-              <a:latin typeface="+mj-lt"/>
-            </a:endParaRPr>
-          </a:p>
-          <a:p>
-            <a:r>
-              <a:rPr lang="en-US" smtClean="0">
-                <a:latin typeface="+mj-lt"/>
-              </a:rPr>
-              <a:t>C</a:t>
-            </a:r>
-            <a:endParaRPr lang="hu-HU" smtClean="0">
               <a:latin typeface="+mj-lt"/>
             </a:endParaRPr>
           </a:p>
@@ -10537,7 +10428,7 @@
         </p:blipFill>
         <p:spPr>
           <a:xfrm>
-            <a:off x="235575" y="2967565"/>
+            <a:off x="235575" y="3122240"/>
             <a:ext cx="7229095" cy="582083"/>
           </a:xfrm>
           <a:prstGeom prst="rect">

</xml_diff>